<commit_message>
Insertados gráficos de equipos
</commit_message>
<xml_diff>
--- a/presentacion/MetnumBall.pptx
+++ b/presentacion/MetnumBall.pptx
@@ -15,6 +15,7 @@
     <p:sldId id="262" r:id="rId9"/>
     <p:sldId id="264" r:id="rId10"/>
     <p:sldId id="265" r:id="rId11"/>
+    <p:sldId id="266" r:id="rId12"/>
   </p:sldIdLst>
   <p:sldSz cx="12192000" cy="6858000"/>
   <p:notesSz cx="6858000" cy="9144000"/>
@@ -113,6 +114,11 @@
       </a:defRPr>
     </a:lvl9pPr>
   </p:defaultTextStyle>
+  <p:extLst>
+    <p:ext uri="{EFAFB233-063F-42B5-8137-9DF3F51BA10A}">
+      <p15:sldGuideLst xmlns:p15="http://schemas.microsoft.com/office/powerpoint/2012/main"/>
+    </p:ext>
+  </p:extLst>
 </p:presentation>
 </file>
 
@@ -3103,7 +3109,12 @@
             <p:ph type="title"/>
           </p:nvPr>
         </p:nvSpPr>
-        <p:spPr/>
+        <p:spPr>
+          <a:xfrm>
+            <a:off x="838200" y="365125"/>
+            <a:ext cx="10515600" cy="1325563"/>
+          </a:xfrm>
+        </p:spPr>
         <p:txBody>
           <a:bodyPr/>
           <a:lstStyle/>
@@ -3126,36 +3137,19 @@
             <p:ph idx="1"/>
           </p:nvPr>
         </p:nvSpPr>
-        <p:spPr/>
-        <p:txBody>
-          <a:bodyPr/>
-          <a:lstStyle/>
-          <a:p>
-            <a:r>
-              <a:rPr lang="es-AR" dirty="0"/>
-              <a:t>Insertar Gráfico de resultado de una temporada.</a:t>
-            </a:r>
-          </a:p>
-          <a:p>
-            <a:r>
-              <a:rPr lang="es-AR" dirty="0"/>
-              <a:t>Insertar </a:t>
-            </a:r>
-            <a:r>
-              <a:rPr lang="es-AR" dirty="0" err="1"/>
-              <a:t>Four</a:t>
-            </a:r>
-            <a:r>
-              <a:rPr lang="es-AR" dirty="0"/>
-              <a:t> </a:t>
-            </a:r>
-            <a:r>
-              <a:rPr lang="es-AR" dirty="0" err="1"/>
-              <a:t>Factors</a:t>
-            </a:r>
-            <a:r>
-              <a:rPr lang="es-AR" dirty="0"/>
-              <a:t> y PER</a:t>
+        <p:spPr>
+          <a:xfrm>
+            <a:off x="838200" y="1825625"/>
+            <a:ext cx="10515600" cy="4351338"/>
+          </a:xfrm>
+        </p:spPr>
+        <p:txBody>
+          <a:bodyPr/>
+          <a:lstStyle/>
+          <a:p>
+            <a:r>
+              <a:rPr lang="es-AR" dirty="0"/>
+              <a:t>Resultado de la aproximación de una temporada:</a:t>
             </a:r>
           </a:p>
           <a:p>
@@ -3163,10 +3157,170 @@
           </a:p>
         </p:txBody>
       </p:sp>
+      <p:pic>
+        <p:nvPicPr>
+          <p:cNvPr id="4" name="Imagen 3"/>
+          <p:cNvPicPr>
+            <a:picLocks noChangeAspect="1"/>
+          </p:cNvPicPr>
+          <p:nvPr/>
+        </p:nvPicPr>
+        <p:blipFill>
+          <a:blip r:embed="rId2">
+            <a:extLst>
+              <a:ext uri="{28A0092B-C50C-407E-A947-70E740481C1C}">
+                <a14:useLocalDpi xmlns:a14="http://schemas.microsoft.com/office/drawing/2010/main" val="0"/>
+              </a:ext>
+            </a:extLst>
+          </a:blip>
+          <a:stretch>
+            <a:fillRect/>
+          </a:stretch>
+        </p:blipFill>
+        <p:spPr>
+          <a:xfrm>
+            <a:off x="1718348" y="2287945"/>
+            <a:ext cx="9244105" cy="4570055"/>
+          </a:xfrm>
+          <a:prstGeom prst="rect">
+            <a:avLst/>
+          </a:prstGeom>
+        </p:spPr>
+      </p:pic>
     </p:spTree>
     <p:extLst>
       <p:ext uri="{BB962C8B-B14F-4D97-AF65-F5344CB8AC3E}">
         <p14:creationId xmlns:p14="http://schemas.microsoft.com/office/powerpoint/2010/main" val="1501812678"/>
+      </p:ext>
+    </p:extLst>
+  </p:cSld>
+  <p:clrMapOvr>
+    <a:masterClrMapping/>
+  </p:clrMapOvr>
+</p:sld>
+</file>
+
+<file path=ppt/slides/slide11.xml><?xml version="1.0" encoding="utf-8"?>
+<p:sld xmlns:a="http://schemas.openxmlformats.org/drawingml/2006/main" xmlns:r="http://schemas.openxmlformats.org/officeDocument/2006/relationships" xmlns:p="http://schemas.openxmlformats.org/presentationml/2006/main">
+  <p:cSld>
+    <p:spTree>
+      <p:nvGrpSpPr>
+        <p:cNvPr id="1" name=""/>
+        <p:cNvGrpSpPr/>
+        <p:nvPr/>
+      </p:nvGrpSpPr>
+      <p:grpSpPr>
+        <a:xfrm>
+          <a:off x="0" y="0"/>
+          <a:ext cx="0" cy="0"/>
+          <a:chOff x="0" y="0"/>
+          <a:chExt cx="0" cy="0"/>
+        </a:xfrm>
+      </p:grpSpPr>
+      <p:sp>
+        <p:nvSpPr>
+          <p:cNvPr id="2" name="Título 1"/>
+          <p:cNvSpPr>
+            <a:spLocks noGrp="1"/>
+          </p:cNvSpPr>
+          <p:nvPr>
+            <p:ph type="title"/>
+          </p:nvPr>
+        </p:nvSpPr>
+        <p:spPr>
+          <a:xfrm>
+            <a:off x="838200" y="365125"/>
+            <a:ext cx="10515600" cy="1325563"/>
+          </a:xfrm>
+        </p:spPr>
+        <p:txBody>
+          <a:bodyPr/>
+          <a:lstStyle/>
+          <a:p>
+            <a:r>
+              <a:rPr lang="es-AR" dirty="0"/>
+              <a:t>Comparativa </a:t>
+            </a:r>
+            <a:r>
+              <a:rPr lang="es-AR"/>
+              <a:t>con Four Factors</a:t>
+            </a:r>
+            <a:r>
+              <a:rPr lang="es-AR"/>
+              <a:t> </a:t>
+            </a:r>
+            <a:r>
+              <a:rPr lang="es-AR"/>
+              <a:t>y PER</a:t>
+            </a:r>
+            <a:endParaRPr lang="en-US" dirty="0"/>
+          </a:p>
+        </p:txBody>
+      </p:sp>
+      <p:pic>
+        <p:nvPicPr>
+          <p:cNvPr id="4" name="Imagen 3"/>
+          <p:cNvPicPr>
+            <a:picLocks noChangeAspect="1"/>
+          </p:cNvPicPr>
+          <p:nvPr/>
+        </p:nvPicPr>
+        <p:blipFill>
+          <a:blip r:embed="rId2">
+            <a:extLst>
+              <a:ext uri="{28A0092B-C50C-407E-A947-70E740481C1C}">
+                <a14:useLocalDpi xmlns:a14="http://schemas.microsoft.com/office/drawing/2010/main" val="0"/>
+              </a:ext>
+            </a:extLst>
+          </a:blip>
+          <a:stretch>
+            <a:fillRect/>
+          </a:stretch>
+        </p:blipFill>
+        <p:spPr>
+          <a:xfrm>
+            <a:off x="0" y="1918446"/>
+            <a:ext cx="6257365" cy="4524263"/>
+          </a:xfrm>
+          <a:prstGeom prst="rect">
+            <a:avLst/>
+          </a:prstGeom>
+        </p:spPr>
+      </p:pic>
+      <p:pic>
+        <p:nvPicPr>
+          <p:cNvPr id="5" name="Imagen 4"/>
+          <p:cNvPicPr>
+            <a:picLocks noChangeAspect="1"/>
+          </p:cNvPicPr>
+          <p:nvPr/>
+        </p:nvPicPr>
+        <p:blipFill>
+          <a:blip r:embed="rId3">
+            <a:extLst>
+              <a:ext uri="{28A0092B-C50C-407E-A947-70E740481C1C}">
+                <a14:useLocalDpi xmlns:a14="http://schemas.microsoft.com/office/drawing/2010/main" val="0"/>
+              </a:ext>
+            </a:extLst>
+          </a:blip>
+          <a:stretch>
+            <a:fillRect/>
+          </a:stretch>
+        </p:blipFill>
+        <p:spPr>
+          <a:xfrm>
+            <a:off x="5671670" y="1918446"/>
+            <a:ext cx="6520330" cy="4524264"/>
+          </a:xfrm>
+          <a:prstGeom prst="rect">
+            <a:avLst/>
+          </a:prstGeom>
+        </p:spPr>
+      </p:pic>
+    </p:spTree>
+    <p:extLst>
+      <p:ext uri="{BB962C8B-B14F-4D97-AF65-F5344CB8AC3E}">
+        <p14:creationId xmlns:p14="http://schemas.microsoft.com/office/powerpoint/2010/main" val="4081610810"/>
       </p:ext>
     </p:extLst>
   </p:cSld>

</xml_diff>